<commit_message>
Made a change to show Sarah
then pushed to github
</commit_message>
<xml_diff>
--- a/FNS-13032015-Git-Primer.pptx
+++ b/FNS-13032015-Git-Primer.pptx
@@ -200,7 +200,7 @@
           <a:p>
             <a:fld id="{C3D4E9CE-4BD2-7A41-A6CD-77E654297E90}" type="datetimeFigureOut">
               <a:rPr lang="en-US" smtClean="0"/>
-              <a:t>2/24/15</a:t>
+              <a:t>2/25/15</a:t>
             </a:fld>
             <a:endParaRPr lang="en-US"/>
           </a:p>
@@ -687,11 +687,7 @@
             </a:r>
             <a:r>
               <a:rPr lang="en-US" dirty="0" smtClean="0"/>
-              <a:t>-videos-for-beginners</a:t>
-            </a:r>
-            <a:r>
-              <a:rPr lang="en-US" dirty="0" smtClean="0"/>
-              <a:t>/</a:t>
+              <a:t>-videos-for-beginners/</a:t>
             </a:r>
           </a:p>
           <a:p>
@@ -1018,11 +1014,7 @@
             </a:r>
             <a:r>
               <a:rPr lang="en-US" dirty="0" smtClean="0"/>
-              <a:t>/learn/tutorials/796387-beginning-git-and-github-for-linux-users</a:t>
-            </a:r>
-            <a:r>
-              <a:rPr lang="en-US" dirty="0" smtClean="0"/>
-              <a:t>/</a:t>
+              <a:t>/learn/tutorials/796387-beginning-git-and-github-for-linux-users/</a:t>
             </a:r>
           </a:p>
           <a:p>
@@ -1047,7 +1039,6 @@
               <a:rPr lang="en-US" dirty="0" smtClean="0"/>
               <a:t>/presentations/git-in-5-minutes/</a:t>
             </a:r>
-            <a:endParaRPr lang="en-US" dirty="0" smtClean="0"/>
           </a:p>
           <a:p>
             <a:endParaRPr lang="en-US" dirty="0"/>
@@ -1576,7 +1567,7 @@
           <a:p>
             <a:fld id="{7E51C601-AE04-6C49-B06E-E37DF4BFF80E}" type="datetimeFigureOut">
               <a:rPr lang="en-US" smtClean="0"/>
-              <a:t>2/24/15</a:t>
+              <a:t>2/25/15</a:t>
             </a:fld>
             <a:endParaRPr lang="en-US"/>
           </a:p>
@@ -1746,7 +1737,7 @@
           <a:p>
             <a:fld id="{7E51C601-AE04-6C49-B06E-E37DF4BFF80E}" type="datetimeFigureOut">
               <a:rPr lang="en-US" smtClean="0"/>
-              <a:t>2/24/15</a:t>
+              <a:t>2/25/15</a:t>
             </a:fld>
             <a:endParaRPr lang="en-US"/>
           </a:p>
@@ -1926,7 +1917,7 @@
           <a:p>
             <a:fld id="{7E51C601-AE04-6C49-B06E-E37DF4BFF80E}" type="datetimeFigureOut">
               <a:rPr lang="en-US" smtClean="0"/>
-              <a:t>2/24/15</a:t>
+              <a:t>2/25/15</a:t>
             </a:fld>
             <a:endParaRPr lang="en-US"/>
           </a:p>
@@ -2096,7 +2087,7 @@
           <a:p>
             <a:fld id="{7E51C601-AE04-6C49-B06E-E37DF4BFF80E}" type="datetimeFigureOut">
               <a:rPr lang="en-US" smtClean="0"/>
-              <a:t>2/24/15</a:t>
+              <a:t>2/25/15</a:t>
             </a:fld>
             <a:endParaRPr lang="en-US"/>
           </a:p>
@@ -2342,7 +2333,7 @@
           <a:p>
             <a:fld id="{7E51C601-AE04-6C49-B06E-E37DF4BFF80E}" type="datetimeFigureOut">
               <a:rPr lang="en-US" smtClean="0"/>
-              <a:t>2/24/15</a:t>
+              <a:t>2/25/15</a:t>
             </a:fld>
             <a:endParaRPr lang="en-US"/>
           </a:p>
@@ -2630,7 +2621,7 @@
           <a:p>
             <a:fld id="{7E51C601-AE04-6C49-B06E-E37DF4BFF80E}" type="datetimeFigureOut">
               <a:rPr lang="en-US" smtClean="0"/>
-              <a:t>2/24/15</a:t>
+              <a:t>2/25/15</a:t>
             </a:fld>
             <a:endParaRPr lang="en-US"/>
           </a:p>
@@ -3052,7 +3043,7 @@
           <a:p>
             <a:fld id="{7E51C601-AE04-6C49-B06E-E37DF4BFF80E}" type="datetimeFigureOut">
               <a:rPr lang="en-US" smtClean="0"/>
-              <a:t>2/24/15</a:t>
+              <a:t>2/25/15</a:t>
             </a:fld>
             <a:endParaRPr lang="en-US"/>
           </a:p>
@@ -3170,7 +3161,7 @@
           <a:p>
             <a:fld id="{7E51C601-AE04-6C49-B06E-E37DF4BFF80E}" type="datetimeFigureOut">
               <a:rPr lang="en-US" smtClean="0"/>
-              <a:t>2/24/15</a:t>
+              <a:t>2/25/15</a:t>
             </a:fld>
             <a:endParaRPr lang="en-US"/>
           </a:p>
@@ -3265,7 +3256,7 @@
           <a:p>
             <a:fld id="{7E51C601-AE04-6C49-B06E-E37DF4BFF80E}" type="datetimeFigureOut">
               <a:rPr lang="en-US" smtClean="0"/>
-              <a:t>2/24/15</a:t>
+              <a:t>2/25/15</a:t>
             </a:fld>
             <a:endParaRPr lang="en-US"/>
           </a:p>
@@ -3542,7 +3533,7 @@
           <a:p>
             <a:fld id="{7E51C601-AE04-6C49-B06E-E37DF4BFF80E}" type="datetimeFigureOut">
               <a:rPr lang="en-US" smtClean="0"/>
-              <a:t>2/24/15</a:t>
+              <a:t>2/25/15</a:t>
             </a:fld>
             <a:endParaRPr lang="en-US"/>
           </a:p>
@@ -3795,7 +3786,7 @@
           <a:p>
             <a:fld id="{7E51C601-AE04-6C49-B06E-E37DF4BFF80E}" type="datetimeFigureOut">
               <a:rPr lang="en-US" smtClean="0"/>
-              <a:t>2/24/15</a:t>
+              <a:t>2/25/15</a:t>
             </a:fld>
             <a:endParaRPr lang="en-US"/>
           </a:p>
@@ -4008,7 +3999,7 @@
           <a:p>
             <a:fld id="{7E51C601-AE04-6C49-B06E-E37DF4BFF80E}" type="datetimeFigureOut">
               <a:rPr lang="en-US" smtClean="0"/>
-              <a:t>2/24/15</a:t>
+              <a:t>2/25/15</a:t>
             </a:fld>
             <a:endParaRPr lang="en-US"/>
           </a:p>
@@ -5810,27 +5801,7 @@
                   </a:schemeClr>
                 </a:solidFill>
               </a:rPr>
-              <a:t> (the </a:t>
-            </a:r>
-            <a:r>
-              <a:rPr lang="en-US" dirty="0" smtClean="0">
-                <a:solidFill>
-                  <a:schemeClr val="bg1">
-                    <a:lumMod val="25000"/>
-                  </a:schemeClr>
-                </a:solidFill>
-              </a:rPr>
-              <a:t>VCS</a:t>
-            </a:r>
-            <a:r>
-              <a:rPr lang="en-US" dirty="0" smtClean="0">
-                <a:solidFill>
-                  <a:schemeClr val="bg1">
-                    <a:lumMod val="25000"/>
-                  </a:schemeClr>
-                </a:solidFill>
-              </a:rPr>
-              <a:t>)</a:t>
+              <a:t> (the VCS)</a:t>
             </a:r>
           </a:p>
           <a:p>
@@ -6304,6 +6275,14 @@
           <a:bodyPr/>
           <a:lstStyle/>
           <a:p>
+            <a:r>
+              <a:rPr lang="en-US" dirty="0" smtClean="0"/>
+              <a:t>Making </a:t>
+            </a:r>
+            <a:r>
+              <a:rPr lang="en-US" smtClean="0"/>
+              <a:t>some changes!</a:t>
+            </a:r>
             <a:endParaRPr lang="en-US"/>
           </a:p>
         </p:txBody>

</xml_diff>

<commit_message>
charlotte added a slide
</commit_message>
<xml_diff>
--- a/FNS-13032015-Git-Primer.pptx
+++ b/FNS-13032015-Git-Primer.pptx
@@ -5,18 +5,19 @@
     <p:sldMasterId id="2147483648" r:id="rId1"/>
   </p:sldMasterIdLst>
   <p:notesMasterIdLst>
-    <p:notesMasterId r:id="rId11"/>
+    <p:notesMasterId r:id="rId12"/>
   </p:notesMasterIdLst>
   <p:sldIdLst>
-    <p:sldId id="256" r:id="rId2"/>
-    <p:sldId id="257" r:id="rId3"/>
-    <p:sldId id="258" r:id="rId4"/>
-    <p:sldId id="259" r:id="rId5"/>
-    <p:sldId id="260" r:id="rId6"/>
-    <p:sldId id="261" r:id="rId7"/>
-    <p:sldId id="264" r:id="rId8"/>
-    <p:sldId id="262" r:id="rId9"/>
-    <p:sldId id="263" r:id="rId10"/>
+    <p:sldId id="265" r:id="rId2"/>
+    <p:sldId id="256" r:id="rId3"/>
+    <p:sldId id="257" r:id="rId4"/>
+    <p:sldId id="258" r:id="rId5"/>
+    <p:sldId id="259" r:id="rId6"/>
+    <p:sldId id="260" r:id="rId7"/>
+    <p:sldId id="261" r:id="rId8"/>
+    <p:sldId id="264" r:id="rId9"/>
+    <p:sldId id="262" r:id="rId10"/>
+    <p:sldId id="263" r:id="rId11"/>
   </p:sldIdLst>
   <p:sldSz cx="9144000" cy="6858000" type="screen4x3"/>
   <p:notesSz cx="6858000" cy="9144000"/>
@@ -555,7 +556,7 @@
           <a:p>
             <a:fld id="{00960702-ED8E-B745-AF23-B1C605AE971C}" type="slidenum">
               <a:rPr lang="en-US" smtClean="0"/>
-              <a:t>1</a:t>
+              <a:t>2</a:t>
             </a:fld>
             <a:endParaRPr lang="en-US"/>
           </a:p>
@@ -750,7 +751,7 @@
           <a:p>
             <a:fld id="{00960702-ED8E-B745-AF23-B1C605AE971C}" type="slidenum">
               <a:rPr lang="en-US" smtClean="0"/>
-              <a:t>3</a:t>
+              <a:t>4</a:t>
             </a:fld>
             <a:endParaRPr lang="en-US"/>
           </a:p>
@@ -857,7 +858,7 @@
           <a:p>
             <a:fld id="{00960702-ED8E-B745-AF23-B1C605AE971C}" type="slidenum">
               <a:rPr lang="en-US" smtClean="0"/>
-              <a:t>4</a:t>
+              <a:t>5</a:t>
             </a:fld>
             <a:endParaRPr lang="en-US"/>
           </a:p>
@@ -1062,7 +1063,7 @@
           <a:p>
             <a:fld id="{00960702-ED8E-B745-AF23-B1C605AE971C}" type="slidenum">
               <a:rPr lang="en-US" smtClean="0"/>
-              <a:t>6</a:t>
+              <a:t>7</a:t>
             </a:fld>
             <a:endParaRPr lang="en-US"/>
           </a:p>
@@ -1255,7 +1256,7 @@
           <a:p>
             <a:fld id="{00960702-ED8E-B745-AF23-B1C605AE971C}" type="slidenum">
               <a:rPr lang="en-US" smtClean="0"/>
-              <a:t>8</a:t>
+              <a:t>9</a:t>
             </a:fld>
             <a:endParaRPr lang="en-US"/>
           </a:p>
@@ -1367,7 +1368,7 @@
           <a:p>
             <a:fld id="{00960702-ED8E-B745-AF23-B1C605AE971C}" type="slidenum">
               <a:rPr lang="en-US" smtClean="0"/>
-              <a:t>9</a:t>
+              <a:t>10</a:t>
             </a:fld>
             <a:endParaRPr lang="en-US"/>
           </a:p>
@@ -4374,6 +4375,206 @@
           <a:chExt cx="0" cy="0"/>
         </a:xfrm>
       </p:grpSpPr>
+      <p:sp>
+        <p:nvSpPr>
+          <p:cNvPr id="2" name="Title 1"/>
+          <p:cNvSpPr>
+            <a:spLocks noGrp="1"/>
+          </p:cNvSpPr>
+          <p:nvPr>
+            <p:ph type="title"/>
+          </p:nvPr>
+        </p:nvSpPr>
+        <p:spPr/>
+        <p:txBody>
+          <a:bodyPr/>
+          <a:lstStyle/>
+          <a:p>
+            <a:r>
+              <a:rPr lang="en-US" dirty="0" smtClean="0"/>
+              <a:t>Charlotte made </a:t>
+            </a:r>
+            <a:r>
+              <a:rPr lang="en-US" smtClean="0"/>
+              <a:t>a change!</a:t>
+            </a:r>
+            <a:endParaRPr lang="en-US"/>
+          </a:p>
+        </p:txBody>
+      </p:sp>
+      <p:sp>
+        <p:nvSpPr>
+          <p:cNvPr id="3" name="Content Placeholder 2"/>
+          <p:cNvSpPr>
+            <a:spLocks noGrp="1"/>
+          </p:cNvSpPr>
+          <p:nvPr>
+            <p:ph idx="1"/>
+          </p:nvPr>
+        </p:nvSpPr>
+        <p:spPr/>
+        <p:txBody>
+          <a:bodyPr/>
+          <a:lstStyle/>
+          <a:p>
+            <a:endParaRPr lang="en-US"/>
+          </a:p>
+        </p:txBody>
+      </p:sp>
+    </p:spTree>
+    <p:extLst>
+      <p:ext uri="{BB962C8B-B14F-4D97-AF65-F5344CB8AC3E}">
+        <p14:creationId xmlns:p14="http://schemas.microsoft.com/office/powerpoint/2010/main" val="72764179"/>
+      </p:ext>
+    </p:extLst>
+  </p:cSld>
+  <p:clrMapOvr>
+    <a:masterClrMapping/>
+  </p:clrMapOvr>
+</p:sld>
+</file>
+
+<file path=ppt/slides/slide10.xml><?xml version="1.0" encoding="utf-8"?>
+<p:sld xmlns:a="http://schemas.openxmlformats.org/drawingml/2006/main" xmlns:r="http://schemas.openxmlformats.org/officeDocument/2006/relationships" xmlns:p="http://schemas.openxmlformats.org/presentationml/2006/main">
+  <p:cSld>
+    <p:bg>
+      <p:bgPr>
+        <a:solidFill>
+          <a:schemeClr val="bg2"/>
+        </a:solidFill>
+        <a:effectLst/>
+      </p:bgPr>
+    </p:bg>
+    <p:spTree>
+      <p:nvGrpSpPr>
+        <p:cNvPr id="1" name=""/>
+        <p:cNvGrpSpPr/>
+        <p:nvPr/>
+      </p:nvGrpSpPr>
+      <p:grpSpPr>
+        <a:xfrm>
+          <a:off x="0" y="0"/>
+          <a:ext cx="0" cy="0"/>
+          <a:chOff x="0" y="0"/>
+          <a:chExt cx="0" cy="0"/>
+        </a:xfrm>
+      </p:grpSpPr>
+      <p:sp>
+        <p:nvSpPr>
+          <p:cNvPr id="2" name="Title 1"/>
+          <p:cNvSpPr>
+            <a:spLocks noGrp="1"/>
+          </p:cNvSpPr>
+          <p:nvPr>
+            <p:ph type="title"/>
+          </p:nvPr>
+        </p:nvSpPr>
+        <p:spPr>
+          <a:xfrm>
+            <a:off x="457200" y="0"/>
+            <a:ext cx="8229600" cy="635053"/>
+          </a:xfrm>
+        </p:spPr>
+        <p:txBody>
+          <a:bodyPr>
+            <a:normAutofit fontScale="90000"/>
+          </a:bodyPr>
+          <a:lstStyle/>
+          <a:p>
+            <a:r>
+              <a:rPr lang="en-US" dirty="0" smtClean="0">
+                <a:solidFill>
+                  <a:srgbClr val="B3B3B3"/>
+                </a:solidFill>
+              </a:rPr>
+              <a:t>Branches</a:t>
+            </a:r>
+            <a:endParaRPr lang="en-US" dirty="0">
+              <a:solidFill>
+                <a:srgbClr val="B3B3B3"/>
+              </a:solidFill>
+            </a:endParaRPr>
+          </a:p>
+        </p:txBody>
+      </p:sp>
+      <p:pic>
+        <p:nvPicPr>
+          <p:cNvPr id="4" name="Picture 3"/>
+          <p:cNvPicPr>
+            <a:picLocks noChangeAspect="1"/>
+          </p:cNvPicPr>
+          <p:nvPr/>
+        </p:nvPicPr>
+        <p:blipFill>
+          <a:blip r:embed="rId3"/>
+          <a:stretch>
+            <a:fillRect/>
+          </a:stretch>
+        </p:blipFill>
+        <p:spPr>
+          <a:xfrm>
+            <a:off x="0" y="544333"/>
+            <a:ext cx="6084564" cy="4806895"/>
+          </a:xfrm>
+          <a:prstGeom prst="rect">
+            <a:avLst/>
+          </a:prstGeom>
+        </p:spPr>
+      </p:pic>
+      <p:pic>
+        <p:nvPicPr>
+          <p:cNvPr id="5" name="Picture 4"/>
+          <p:cNvPicPr>
+            <a:picLocks noChangeAspect="1"/>
+          </p:cNvPicPr>
+          <p:nvPr/>
+        </p:nvPicPr>
+        <p:blipFill>
+          <a:blip r:embed="rId4"/>
+          <a:stretch>
+            <a:fillRect/>
+          </a:stretch>
+        </p:blipFill>
+        <p:spPr>
+          <a:xfrm>
+            <a:off x="2993664" y="1691718"/>
+            <a:ext cx="6150336" cy="5166282"/>
+          </a:xfrm>
+          <a:prstGeom prst="rect">
+            <a:avLst/>
+          </a:prstGeom>
+        </p:spPr>
+      </p:pic>
+    </p:spTree>
+    <p:extLst>
+      <p:ext uri="{BB962C8B-B14F-4D97-AF65-F5344CB8AC3E}">
+        <p14:creationId xmlns:p14="http://schemas.microsoft.com/office/powerpoint/2010/main" val="2345488456"/>
+      </p:ext>
+    </p:extLst>
+  </p:cSld>
+  <p:clrMapOvr>
+    <a:masterClrMapping/>
+  </p:clrMapOvr>
+</p:sld>
+</file>
+
+<file path=ppt/slides/slide2.xml><?xml version="1.0" encoding="utf-8"?>
+<p:sld xmlns:a="http://schemas.openxmlformats.org/drawingml/2006/main" xmlns:r="http://schemas.openxmlformats.org/officeDocument/2006/relationships" xmlns:p="http://schemas.openxmlformats.org/presentationml/2006/main">
+  <p:cSld>
+    <p:spTree>
+      <p:nvGrpSpPr>
+        <p:cNvPr id="1" name=""/>
+        <p:cNvGrpSpPr/>
+        <p:nvPr/>
+      </p:nvGrpSpPr>
+      <p:grpSpPr>
+        <a:xfrm>
+          <a:off x="0" y="0"/>
+          <a:ext cx="0" cy="0"/>
+          <a:chOff x="0" y="0"/>
+          <a:chExt cx="0" cy="0"/>
+        </a:xfrm>
+      </p:grpSpPr>
       <p:pic>
         <p:nvPicPr>
           <p:cNvPr id="5" name="Picture 4"/>
@@ -4530,7 +4731,7 @@
 </p:sld>
 </file>
 
-<file path=ppt/slides/slide2.xml><?xml version="1.0" encoding="utf-8"?>
+<file path=ppt/slides/slide3.xml><?xml version="1.0" encoding="utf-8"?>
 <p:sld xmlns:a="http://schemas.openxmlformats.org/drawingml/2006/main" xmlns:r="http://schemas.openxmlformats.org/officeDocument/2006/relationships" xmlns:p="http://schemas.openxmlformats.org/presentationml/2006/main">
   <p:cSld>
     <p:bg>
@@ -4749,7 +4950,7 @@
 </p:sld>
 </file>
 
-<file path=ppt/slides/slide3.xml><?xml version="1.0" encoding="utf-8"?>
+<file path=ppt/slides/slide4.xml><?xml version="1.0" encoding="utf-8"?>
 <p:sld xmlns:a="http://schemas.openxmlformats.org/drawingml/2006/main" xmlns:r="http://schemas.openxmlformats.org/officeDocument/2006/relationships" xmlns:p="http://schemas.openxmlformats.org/presentationml/2006/main">
   <p:cSld>
     <p:spTree>
@@ -5375,7 +5576,7 @@
 </p:sld>
 </file>
 
-<file path=ppt/slides/slide4.xml><?xml version="1.0" encoding="utf-8"?>
+<file path=ppt/slides/slide5.xml><?xml version="1.0" encoding="utf-8"?>
 <p:sld xmlns:a="http://schemas.openxmlformats.org/drawingml/2006/main" xmlns:r="http://schemas.openxmlformats.org/officeDocument/2006/relationships" xmlns:p="http://schemas.openxmlformats.org/presentationml/2006/main">
   <p:cSld>
     <p:spTree>
@@ -5682,7 +5883,7 @@
 </p:sld>
 </file>
 
-<file path=ppt/slides/slide5.xml><?xml version="1.0" encoding="utf-8"?>
+<file path=ppt/slides/slide6.xml><?xml version="1.0" encoding="utf-8"?>
 <p:sld xmlns:a="http://schemas.openxmlformats.org/drawingml/2006/main" xmlns:r="http://schemas.openxmlformats.org/officeDocument/2006/relationships" xmlns:p="http://schemas.openxmlformats.org/presentationml/2006/main">
   <p:cSld>
     <p:bg>
@@ -5930,7 +6131,7 @@
 </p:sld>
 </file>
 
-<file path=ppt/slides/slide6.xml><?xml version="1.0" encoding="utf-8"?>
+<file path=ppt/slides/slide7.xml><?xml version="1.0" encoding="utf-8"?>
 <p:sld xmlns:a="http://schemas.openxmlformats.org/drawingml/2006/main" xmlns:r="http://schemas.openxmlformats.org/officeDocument/2006/relationships" xmlns:p="http://schemas.openxmlformats.org/presentationml/2006/main">
   <p:cSld>
     <p:bg>
@@ -6218,7 +6419,7 @@
 </p:sld>
 </file>
 
-<file path=ppt/slides/slide7.xml><?xml version="1.0" encoding="utf-8"?>
+<file path=ppt/slides/slide8.xml><?xml version="1.0" encoding="utf-8"?>
 <p:sld xmlns:a="http://schemas.openxmlformats.org/drawingml/2006/main" xmlns:r="http://schemas.openxmlformats.org/officeDocument/2006/relationships" xmlns:p="http://schemas.openxmlformats.org/presentationml/2006/main">
   <p:cSld>
     <p:spTree>
@@ -6300,7 +6501,7 @@
 </p:sld>
 </file>
 
-<file path=ppt/slides/slide8.xml><?xml version="1.0" encoding="utf-8"?>
+<file path=ppt/slides/slide9.xml><?xml version="1.0" encoding="utf-8"?>
 <p:sld xmlns:a="http://schemas.openxmlformats.org/drawingml/2006/main" xmlns:r="http://schemas.openxmlformats.org/officeDocument/2006/relationships" xmlns:p="http://schemas.openxmlformats.org/presentationml/2006/main">
   <p:cSld>
     <p:bg>
@@ -6408,130 +6609,6 @@
     <p:extLst>
       <p:ext uri="{BB962C8B-B14F-4D97-AF65-F5344CB8AC3E}">
         <p14:creationId xmlns:p14="http://schemas.microsoft.com/office/powerpoint/2010/main" val="917612111"/>
-      </p:ext>
-    </p:extLst>
-  </p:cSld>
-  <p:clrMapOvr>
-    <a:masterClrMapping/>
-  </p:clrMapOvr>
-</p:sld>
-</file>
-
-<file path=ppt/slides/slide9.xml><?xml version="1.0" encoding="utf-8"?>
-<p:sld xmlns:a="http://schemas.openxmlformats.org/drawingml/2006/main" xmlns:r="http://schemas.openxmlformats.org/officeDocument/2006/relationships" xmlns:p="http://schemas.openxmlformats.org/presentationml/2006/main">
-  <p:cSld>
-    <p:bg>
-      <p:bgPr>
-        <a:solidFill>
-          <a:schemeClr val="bg2"/>
-        </a:solidFill>
-        <a:effectLst/>
-      </p:bgPr>
-    </p:bg>
-    <p:spTree>
-      <p:nvGrpSpPr>
-        <p:cNvPr id="1" name=""/>
-        <p:cNvGrpSpPr/>
-        <p:nvPr/>
-      </p:nvGrpSpPr>
-      <p:grpSpPr>
-        <a:xfrm>
-          <a:off x="0" y="0"/>
-          <a:ext cx="0" cy="0"/>
-          <a:chOff x="0" y="0"/>
-          <a:chExt cx="0" cy="0"/>
-        </a:xfrm>
-      </p:grpSpPr>
-      <p:sp>
-        <p:nvSpPr>
-          <p:cNvPr id="2" name="Title 1"/>
-          <p:cNvSpPr>
-            <a:spLocks noGrp="1"/>
-          </p:cNvSpPr>
-          <p:nvPr>
-            <p:ph type="title"/>
-          </p:nvPr>
-        </p:nvSpPr>
-        <p:spPr>
-          <a:xfrm>
-            <a:off x="457200" y="0"/>
-            <a:ext cx="8229600" cy="635053"/>
-          </a:xfrm>
-        </p:spPr>
-        <p:txBody>
-          <a:bodyPr>
-            <a:normAutofit fontScale="90000"/>
-          </a:bodyPr>
-          <a:lstStyle/>
-          <a:p>
-            <a:r>
-              <a:rPr lang="en-US" dirty="0" smtClean="0">
-                <a:solidFill>
-                  <a:srgbClr val="B3B3B3"/>
-                </a:solidFill>
-              </a:rPr>
-              <a:t>Branches</a:t>
-            </a:r>
-            <a:endParaRPr lang="en-US" dirty="0">
-              <a:solidFill>
-                <a:srgbClr val="B3B3B3"/>
-              </a:solidFill>
-            </a:endParaRPr>
-          </a:p>
-        </p:txBody>
-      </p:sp>
-      <p:pic>
-        <p:nvPicPr>
-          <p:cNvPr id="4" name="Picture 3"/>
-          <p:cNvPicPr>
-            <a:picLocks noChangeAspect="1"/>
-          </p:cNvPicPr>
-          <p:nvPr/>
-        </p:nvPicPr>
-        <p:blipFill>
-          <a:blip r:embed="rId3"/>
-          <a:stretch>
-            <a:fillRect/>
-          </a:stretch>
-        </p:blipFill>
-        <p:spPr>
-          <a:xfrm>
-            <a:off x="0" y="544333"/>
-            <a:ext cx="6084564" cy="4806895"/>
-          </a:xfrm>
-          <a:prstGeom prst="rect">
-            <a:avLst/>
-          </a:prstGeom>
-        </p:spPr>
-      </p:pic>
-      <p:pic>
-        <p:nvPicPr>
-          <p:cNvPr id="5" name="Picture 4"/>
-          <p:cNvPicPr>
-            <a:picLocks noChangeAspect="1"/>
-          </p:cNvPicPr>
-          <p:nvPr/>
-        </p:nvPicPr>
-        <p:blipFill>
-          <a:blip r:embed="rId4"/>
-          <a:stretch>
-            <a:fillRect/>
-          </a:stretch>
-        </p:blipFill>
-        <p:spPr>
-          <a:xfrm>
-            <a:off x="2993664" y="1691718"/>
-            <a:ext cx="6150336" cy="5166282"/>
-          </a:xfrm>
-          <a:prstGeom prst="rect">
-            <a:avLst/>
-          </a:prstGeom>
-        </p:spPr>
-      </p:pic>
-    </p:spTree>
-    <p:extLst>
-      <p:ext uri="{BB962C8B-B14F-4D97-AF65-F5344CB8AC3E}">
-        <p14:creationId xmlns:p14="http://schemas.microsoft.com/office/powerpoint/2010/main" val="2345488456"/>
       </p:ext>
     </p:extLst>
   </p:cSld>

</xml_diff>

<commit_message>
final ppt for FNS
</commit_message>
<xml_diff>
--- a/FNS-13032015-Git-Primer.pptx
+++ b/FNS-13032015-Git-Primer.pptx
@@ -5,7 +5,7 @@
     <p:sldMasterId id="2147483648" r:id="rId1"/>
   </p:sldMasterIdLst>
   <p:notesMasterIdLst>
-    <p:notesMasterId r:id="rId13"/>
+    <p:notesMasterId r:id="rId17"/>
   </p:notesMasterIdLst>
   <p:sldIdLst>
     <p:sldId id="256" r:id="rId2"/>
@@ -16,9 +16,13 @@
     <p:sldId id="258" r:id="rId7"/>
     <p:sldId id="259" r:id="rId8"/>
     <p:sldId id="261" r:id="rId9"/>
-    <p:sldId id="264" r:id="rId10"/>
-    <p:sldId id="262" r:id="rId11"/>
-    <p:sldId id="263" r:id="rId12"/>
+    <p:sldId id="267" r:id="rId10"/>
+    <p:sldId id="268" r:id="rId11"/>
+    <p:sldId id="270" r:id="rId12"/>
+    <p:sldId id="269" r:id="rId13"/>
+    <p:sldId id="264" r:id="rId14"/>
+    <p:sldId id="262" r:id="rId15"/>
+    <p:sldId id="263" r:id="rId16"/>
   </p:sldIdLst>
   <p:sldSz cx="9144000" cy="6858000" type="screen4x3"/>
   <p:notesSz cx="6858000" cy="9144000"/>
@@ -924,6 +928,37 @@
           <a:p>
             <a:r>
               <a:rPr lang="en-US" dirty="0" smtClean="0"/>
+              <a:t>FOR EXPLANING</a:t>
+            </a:r>
+          </a:p>
+          <a:p>
+            <a:r>
+              <a:rPr lang="en-US" dirty="0" smtClean="0"/>
+              <a:t>https://</a:t>
+            </a:r>
+            <a:r>
+              <a:rPr lang="en-US" dirty="0" err="1" smtClean="0"/>
+              <a:t>github.com</a:t>
+            </a:r>
+            <a:r>
+              <a:rPr lang="en-US" dirty="0" smtClean="0"/>
+              <a:t>/</a:t>
+            </a:r>
+            <a:r>
+              <a:rPr lang="en-US" dirty="0" err="1" smtClean="0"/>
+              <a:t>coconn</a:t>
+            </a:r>
+            <a:r>
+              <a:rPr lang="en-US" dirty="0" smtClean="0"/>
+              <a:t>/cso011code_TanguroN2OLosses/commits/master</a:t>
+            </a:r>
+          </a:p>
+          <a:p>
+            <a:endParaRPr lang="en-US" dirty="0" smtClean="0"/>
+          </a:p>
+          <a:p>
+            <a:r>
+              <a:rPr lang="en-US" dirty="0" smtClean="0"/>
               <a:t>Linux resources – </a:t>
             </a:r>
           </a:p>
@@ -1257,7 +1292,7 @@
           <a:p>
             <a:fld id="{00960702-ED8E-B745-AF23-B1C605AE971C}" type="slidenum">
               <a:rPr lang="en-US" smtClean="0"/>
-              <a:t>10</a:t>
+              <a:t>14</a:t>
             </a:fld>
             <a:endParaRPr lang="en-US"/>
           </a:p>
@@ -1369,7 +1404,7 @@
           <a:p>
             <a:fld id="{00960702-ED8E-B745-AF23-B1C605AE971C}" type="slidenum">
               <a:rPr lang="en-US" smtClean="0"/>
-              <a:t>11</a:t>
+              <a:t>15</a:t>
             </a:fld>
             <a:endParaRPr lang="en-US"/>
           </a:p>
@@ -4434,6 +4469,964 @@
     <p:bg>
       <p:bgPr>
         <a:solidFill>
+          <a:schemeClr val="tx2"/>
+        </a:solidFill>
+        <a:effectLst/>
+      </p:bgPr>
+    </p:bg>
+    <p:spTree>
+      <p:nvGrpSpPr>
+        <p:cNvPr id="1" name=""/>
+        <p:cNvGrpSpPr/>
+        <p:nvPr/>
+      </p:nvGrpSpPr>
+      <p:grpSpPr>
+        <a:xfrm>
+          <a:off x="0" y="0"/>
+          <a:ext cx="0" cy="0"/>
+          <a:chOff x="0" y="0"/>
+          <a:chExt cx="0" cy="0"/>
+        </a:xfrm>
+      </p:grpSpPr>
+      <p:sp>
+        <p:nvSpPr>
+          <p:cNvPr id="4" name="Content Placeholder 2"/>
+          <p:cNvSpPr>
+            <a:spLocks noGrp="1"/>
+          </p:cNvSpPr>
+          <p:nvPr>
+            <p:ph idx="1"/>
+          </p:nvPr>
+        </p:nvSpPr>
+        <p:spPr>
+          <a:xfrm>
+            <a:off x="1" y="132887"/>
+            <a:ext cx="5686728" cy="6623971"/>
+          </a:xfrm>
+        </p:spPr>
+        <p:txBody>
+          <a:bodyPr anchor="ctr">
+            <a:normAutofit fontScale="85000" lnSpcReduction="20000"/>
+          </a:bodyPr>
+          <a:lstStyle/>
+          <a:p>
+            <a:pPr marL="0" indent="0">
+              <a:buNone/>
+            </a:pPr>
+            <a:r>
+              <a:rPr lang="en-US" dirty="0" smtClean="0">
+                <a:solidFill>
+                  <a:schemeClr val="bg1">
+                    <a:lumMod val="25000"/>
+                  </a:schemeClr>
+                </a:solidFill>
+              </a:rPr>
+              <a:t>Turn to your neighbor and take 2 minutes to think of a project at work you want to use this system for…</a:t>
+            </a:r>
+          </a:p>
+          <a:p>
+            <a:pPr marL="0" indent="0">
+              <a:buNone/>
+            </a:pPr>
+            <a:endParaRPr lang="en-US" dirty="0" smtClean="0">
+              <a:solidFill>
+                <a:schemeClr val="bg1">
+                  <a:lumMod val="25000"/>
+                </a:schemeClr>
+              </a:solidFill>
+            </a:endParaRPr>
+          </a:p>
+          <a:p>
+            <a:pPr marL="0" indent="0">
+              <a:buNone/>
+            </a:pPr>
+            <a:r>
+              <a:rPr lang="en-US" b="1" dirty="0">
+                <a:solidFill>
+                  <a:schemeClr val="bg1">
+                    <a:lumMod val="25000"/>
+                  </a:schemeClr>
+                </a:solidFill>
+              </a:rPr>
+              <a:t>Task 2!</a:t>
+            </a:r>
+            <a:endParaRPr lang="en-US" dirty="0">
+              <a:solidFill>
+                <a:schemeClr val="bg1">
+                  <a:lumMod val="25000"/>
+                </a:schemeClr>
+              </a:solidFill>
+            </a:endParaRPr>
+          </a:p>
+          <a:p>
+            <a:r>
+              <a:rPr lang="en-US" dirty="0" smtClean="0">
+                <a:solidFill>
+                  <a:schemeClr val="bg1">
+                    <a:lumMod val="25000"/>
+                  </a:schemeClr>
+                </a:solidFill>
+              </a:rPr>
+              <a:t>Create a new folder on your computer for that project (OR find that folder if it exists)</a:t>
+            </a:r>
+          </a:p>
+          <a:p>
+            <a:r>
+              <a:rPr lang="en-US" dirty="0" smtClean="0">
+                <a:solidFill>
+                  <a:schemeClr val="bg1">
+                    <a:lumMod val="25000"/>
+                  </a:schemeClr>
+                </a:solidFill>
+              </a:rPr>
+              <a:t>Go to your </a:t>
+            </a:r>
+            <a:r>
+              <a:rPr lang="en-US" dirty="0" err="1" smtClean="0">
+                <a:solidFill>
+                  <a:schemeClr val="bg1">
+                    <a:lumMod val="25000"/>
+                  </a:schemeClr>
+                </a:solidFill>
+              </a:rPr>
+              <a:t>Github</a:t>
+            </a:r>
+            <a:r>
+              <a:rPr lang="en-US" dirty="0" smtClean="0">
+                <a:solidFill>
+                  <a:schemeClr val="bg1">
+                    <a:lumMod val="25000"/>
+                  </a:schemeClr>
+                </a:solidFill>
+              </a:rPr>
+              <a:t> program</a:t>
+            </a:r>
+          </a:p>
+          <a:p>
+            <a:r>
+              <a:rPr lang="en-US" dirty="0" smtClean="0">
+                <a:solidFill>
+                  <a:schemeClr val="bg1">
+                    <a:lumMod val="25000"/>
+                  </a:schemeClr>
+                </a:solidFill>
+              </a:rPr>
+              <a:t>Click “Add a repo” (or “+”, etc.)</a:t>
+            </a:r>
+          </a:p>
+          <a:p>
+            <a:r>
+              <a:rPr lang="en-US" dirty="0" smtClean="0">
+                <a:solidFill>
+                  <a:schemeClr val="bg1">
+                    <a:lumMod val="25000"/>
+                  </a:schemeClr>
+                </a:solidFill>
+              </a:rPr>
+              <a:t>Find that folder!</a:t>
+            </a:r>
+          </a:p>
+          <a:p>
+            <a:r>
+              <a:rPr lang="en-US" dirty="0" smtClean="0">
+                <a:solidFill>
+                  <a:schemeClr val="bg1">
+                    <a:lumMod val="25000"/>
+                  </a:schemeClr>
+                </a:solidFill>
+              </a:rPr>
+              <a:t>Push that folder to </a:t>
+            </a:r>
+            <a:r>
+              <a:rPr lang="en-US" dirty="0" err="1" smtClean="0">
+                <a:solidFill>
+                  <a:schemeClr val="bg1">
+                    <a:lumMod val="25000"/>
+                  </a:schemeClr>
+                </a:solidFill>
+              </a:rPr>
+              <a:t>Github</a:t>
+            </a:r>
+            <a:r>
+              <a:rPr lang="en-US" dirty="0" smtClean="0">
+                <a:solidFill>
+                  <a:schemeClr val="bg1">
+                    <a:lumMod val="25000"/>
+                  </a:schemeClr>
+                </a:solidFill>
+              </a:rPr>
+              <a:t>!</a:t>
+            </a:r>
+          </a:p>
+          <a:p>
+            <a:r>
+              <a:rPr lang="en-US" dirty="0" smtClean="0">
+                <a:solidFill>
+                  <a:schemeClr val="bg1">
+                    <a:lumMod val="25000"/>
+                  </a:schemeClr>
+                </a:solidFill>
+              </a:rPr>
+              <a:t>Click refresh on your </a:t>
+            </a:r>
+            <a:r>
+              <a:rPr lang="en-US" dirty="0" err="1" smtClean="0">
+                <a:solidFill>
+                  <a:schemeClr val="bg1">
+                    <a:lumMod val="25000"/>
+                  </a:schemeClr>
+                </a:solidFill>
+              </a:rPr>
+              <a:t>Github</a:t>
+            </a:r>
+            <a:r>
+              <a:rPr lang="en-US" dirty="0" smtClean="0">
+                <a:solidFill>
+                  <a:schemeClr val="bg1">
+                    <a:lumMod val="25000"/>
+                  </a:schemeClr>
+                </a:solidFill>
+              </a:rPr>
+              <a:t> landing page online</a:t>
+            </a:r>
+          </a:p>
+          <a:p>
+            <a:r>
+              <a:rPr lang="en-US" dirty="0" smtClean="0">
+                <a:solidFill>
+                  <a:schemeClr val="bg1">
+                    <a:lumMod val="25000"/>
+                  </a:schemeClr>
+                </a:solidFill>
+              </a:rPr>
+              <a:t>You should see the new repo!</a:t>
+            </a:r>
+          </a:p>
+        </p:txBody>
+      </p:sp>
+      <p:pic>
+        <p:nvPicPr>
+          <p:cNvPr id="5" name="Picture 4"/>
+          <p:cNvPicPr>
+            <a:picLocks noChangeAspect="1"/>
+          </p:cNvPicPr>
+          <p:nvPr/>
+        </p:nvPicPr>
+        <p:blipFill>
+          <a:blip r:embed="rId2"/>
+          <a:stretch>
+            <a:fillRect/>
+          </a:stretch>
+        </p:blipFill>
+        <p:spPr>
+          <a:xfrm>
+            <a:off x="5001710" y="618091"/>
+            <a:ext cx="4329748" cy="4441826"/>
+          </a:xfrm>
+          <a:prstGeom prst="rect">
+            <a:avLst/>
+          </a:prstGeom>
+        </p:spPr>
+      </p:pic>
+    </p:spTree>
+    <p:extLst>
+      <p:ext uri="{BB962C8B-B14F-4D97-AF65-F5344CB8AC3E}">
+        <p14:creationId xmlns:p14="http://schemas.microsoft.com/office/powerpoint/2010/main" val="3472498604"/>
+      </p:ext>
+    </p:extLst>
+  </p:cSld>
+  <p:clrMapOvr>
+    <a:masterClrMapping/>
+  </p:clrMapOvr>
+</p:sld>
+</file>
+
+<file path=ppt/slides/slide11.xml><?xml version="1.0" encoding="utf-8"?>
+<p:sld xmlns:a="http://schemas.openxmlformats.org/drawingml/2006/main" xmlns:r="http://schemas.openxmlformats.org/officeDocument/2006/relationships" xmlns:p="http://schemas.openxmlformats.org/presentationml/2006/main">
+  <p:cSld>
+    <p:bg>
+      <p:bgPr>
+        <a:solidFill>
+          <a:schemeClr val="accent6">
+            <a:lumMod val="75000"/>
+          </a:schemeClr>
+        </a:solidFill>
+        <a:effectLst/>
+      </p:bgPr>
+    </p:bg>
+    <p:spTree>
+      <p:nvGrpSpPr>
+        <p:cNvPr id="1" name=""/>
+        <p:cNvGrpSpPr/>
+        <p:nvPr/>
+      </p:nvGrpSpPr>
+      <p:grpSpPr>
+        <a:xfrm>
+          <a:off x="0" y="0"/>
+          <a:ext cx="0" cy="0"/>
+          <a:chOff x="0" y="0"/>
+          <a:chExt cx="0" cy="0"/>
+        </a:xfrm>
+      </p:grpSpPr>
+      <p:sp>
+        <p:nvSpPr>
+          <p:cNvPr id="4" name="Content Placeholder 2"/>
+          <p:cNvSpPr txBox="1">
+            <a:spLocks/>
+          </p:cNvSpPr>
+          <p:nvPr/>
+        </p:nvSpPr>
+        <p:spPr>
+          <a:xfrm>
+            <a:off x="189417" y="76641"/>
+            <a:ext cx="6122457" cy="6623971"/>
+          </a:xfrm>
+          <a:prstGeom prst="rect">
+            <a:avLst/>
+          </a:prstGeom>
+        </p:spPr>
+        <p:txBody>
+          <a:bodyPr vert="horz" lIns="91440" tIns="45720" rIns="91440" bIns="45720" rtlCol="0" anchor="ctr">
+            <a:normAutofit fontScale="85000" lnSpcReduction="10000"/>
+          </a:bodyPr>
+          <a:lstStyle>
+            <a:lvl1pPr marL="342900" indent="-342900" algn="l" defTabSz="457200" rtl="0" eaLnBrk="1" latinLnBrk="0" hangingPunct="1">
+              <a:spcBef>
+                <a:spcPct val="20000"/>
+              </a:spcBef>
+              <a:buFont typeface="Arial"/>
+              <a:buChar char="•"/>
+              <a:defRPr sz="3200" kern="1200">
+                <a:solidFill>
+                  <a:schemeClr val="tx1"/>
+                </a:solidFill>
+                <a:latin typeface="+mn-lt"/>
+                <a:ea typeface="+mn-ea"/>
+                <a:cs typeface="+mn-cs"/>
+              </a:defRPr>
+            </a:lvl1pPr>
+            <a:lvl2pPr marL="742950" indent="-285750" algn="l" defTabSz="457200" rtl="0" eaLnBrk="1" latinLnBrk="0" hangingPunct="1">
+              <a:spcBef>
+                <a:spcPct val="20000"/>
+              </a:spcBef>
+              <a:buFont typeface="Arial"/>
+              <a:buChar char="–"/>
+              <a:defRPr sz="2800" kern="1200">
+                <a:solidFill>
+                  <a:schemeClr val="tx1"/>
+                </a:solidFill>
+                <a:latin typeface="+mn-lt"/>
+                <a:ea typeface="+mn-ea"/>
+                <a:cs typeface="+mn-cs"/>
+              </a:defRPr>
+            </a:lvl2pPr>
+            <a:lvl3pPr marL="1143000" indent="-228600" algn="l" defTabSz="457200" rtl="0" eaLnBrk="1" latinLnBrk="0" hangingPunct="1">
+              <a:spcBef>
+                <a:spcPct val="20000"/>
+              </a:spcBef>
+              <a:buFont typeface="Arial"/>
+              <a:buChar char="•"/>
+              <a:defRPr sz="2400" kern="1200">
+                <a:solidFill>
+                  <a:schemeClr val="tx1"/>
+                </a:solidFill>
+                <a:latin typeface="+mn-lt"/>
+                <a:ea typeface="+mn-ea"/>
+                <a:cs typeface="+mn-cs"/>
+              </a:defRPr>
+            </a:lvl3pPr>
+            <a:lvl4pPr marL="1600200" indent="-228600" algn="l" defTabSz="457200" rtl="0" eaLnBrk="1" latinLnBrk="0" hangingPunct="1">
+              <a:spcBef>
+                <a:spcPct val="20000"/>
+              </a:spcBef>
+              <a:buFont typeface="Arial"/>
+              <a:buChar char="–"/>
+              <a:defRPr sz="2000" kern="1200">
+                <a:solidFill>
+                  <a:schemeClr val="tx1"/>
+                </a:solidFill>
+                <a:latin typeface="+mn-lt"/>
+                <a:ea typeface="+mn-ea"/>
+                <a:cs typeface="+mn-cs"/>
+              </a:defRPr>
+            </a:lvl4pPr>
+            <a:lvl5pPr marL="2057400" indent="-228600" algn="l" defTabSz="457200" rtl="0" eaLnBrk="1" latinLnBrk="0" hangingPunct="1">
+              <a:spcBef>
+                <a:spcPct val="20000"/>
+              </a:spcBef>
+              <a:buFont typeface="Arial"/>
+              <a:buChar char="»"/>
+              <a:defRPr sz="2000" kern="1200">
+                <a:solidFill>
+                  <a:schemeClr val="tx1"/>
+                </a:solidFill>
+                <a:latin typeface="+mn-lt"/>
+                <a:ea typeface="+mn-ea"/>
+                <a:cs typeface="+mn-cs"/>
+              </a:defRPr>
+            </a:lvl5pPr>
+            <a:lvl6pPr marL="2514600" indent="-228600" algn="l" defTabSz="457200" rtl="0" eaLnBrk="1" latinLnBrk="0" hangingPunct="1">
+              <a:spcBef>
+                <a:spcPct val="20000"/>
+              </a:spcBef>
+              <a:buFont typeface="Arial"/>
+              <a:buChar char="•"/>
+              <a:defRPr sz="2000" kern="1200">
+                <a:solidFill>
+                  <a:schemeClr val="tx1"/>
+                </a:solidFill>
+                <a:latin typeface="+mn-lt"/>
+                <a:ea typeface="+mn-ea"/>
+                <a:cs typeface="+mn-cs"/>
+              </a:defRPr>
+            </a:lvl6pPr>
+            <a:lvl7pPr marL="2971800" indent="-228600" algn="l" defTabSz="457200" rtl="0" eaLnBrk="1" latinLnBrk="0" hangingPunct="1">
+              <a:spcBef>
+                <a:spcPct val="20000"/>
+              </a:spcBef>
+              <a:buFont typeface="Arial"/>
+              <a:buChar char="•"/>
+              <a:defRPr sz="2000" kern="1200">
+                <a:solidFill>
+                  <a:schemeClr val="tx1"/>
+                </a:solidFill>
+                <a:latin typeface="+mn-lt"/>
+                <a:ea typeface="+mn-ea"/>
+                <a:cs typeface="+mn-cs"/>
+              </a:defRPr>
+            </a:lvl7pPr>
+            <a:lvl8pPr marL="3429000" indent="-228600" algn="l" defTabSz="457200" rtl="0" eaLnBrk="1" latinLnBrk="0" hangingPunct="1">
+              <a:spcBef>
+                <a:spcPct val="20000"/>
+              </a:spcBef>
+              <a:buFont typeface="Arial"/>
+              <a:buChar char="•"/>
+              <a:defRPr sz="2000" kern="1200">
+                <a:solidFill>
+                  <a:schemeClr val="tx1"/>
+                </a:solidFill>
+                <a:latin typeface="+mn-lt"/>
+                <a:ea typeface="+mn-ea"/>
+                <a:cs typeface="+mn-cs"/>
+              </a:defRPr>
+            </a:lvl8pPr>
+            <a:lvl9pPr marL="3886200" indent="-228600" algn="l" defTabSz="457200" rtl="0" eaLnBrk="1" latinLnBrk="0" hangingPunct="1">
+              <a:spcBef>
+                <a:spcPct val="20000"/>
+              </a:spcBef>
+              <a:buFont typeface="Arial"/>
+              <a:buChar char="•"/>
+              <a:defRPr sz="2000" kern="1200">
+                <a:solidFill>
+                  <a:schemeClr val="tx1"/>
+                </a:solidFill>
+                <a:latin typeface="+mn-lt"/>
+                <a:ea typeface="+mn-ea"/>
+                <a:cs typeface="+mn-cs"/>
+              </a:defRPr>
+            </a:lvl9pPr>
+          </a:lstStyle>
+          <a:p>
+            <a:pPr marL="0" indent="0">
+              <a:buFont typeface="Arial"/>
+              <a:buNone/>
+            </a:pPr>
+            <a:r>
+              <a:rPr lang="en-US" b="1" dirty="0" smtClean="0">
+                <a:solidFill>
+                  <a:schemeClr val="accent6">
+                    <a:lumMod val="20000"/>
+                    <a:lumOff val="80000"/>
+                  </a:schemeClr>
+                </a:solidFill>
+              </a:rPr>
+              <a:t>Task 3!  Collaboration!</a:t>
+            </a:r>
+            <a:endParaRPr lang="en-US" dirty="0" smtClean="0">
+              <a:solidFill>
+                <a:schemeClr val="accent6">
+                  <a:lumMod val="20000"/>
+                  <a:lumOff val="80000"/>
+                </a:schemeClr>
+              </a:solidFill>
+            </a:endParaRPr>
+          </a:p>
+          <a:p>
+            <a:r>
+              <a:rPr lang="en-US" dirty="0">
+                <a:solidFill>
+                  <a:schemeClr val="accent6">
+                    <a:lumMod val="20000"/>
+                    <a:lumOff val="80000"/>
+                  </a:schemeClr>
+                </a:solidFill>
+              </a:rPr>
+              <a:t>Go to https://</a:t>
+            </a:r>
+            <a:r>
+              <a:rPr lang="en-US" dirty="0" err="1">
+                <a:solidFill>
+                  <a:schemeClr val="accent6">
+                    <a:lumMod val="20000"/>
+                    <a:lumOff val="80000"/>
+                  </a:schemeClr>
+                </a:solidFill>
+              </a:rPr>
+              <a:t>github.com</a:t>
+            </a:r>
+            <a:r>
+              <a:rPr lang="en-US" dirty="0">
+                <a:solidFill>
+                  <a:schemeClr val="accent6">
+                    <a:lumMod val="20000"/>
+                    <a:lumOff val="80000"/>
+                  </a:schemeClr>
+                </a:solidFill>
+              </a:rPr>
+              <a:t>/</a:t>
+            </a:r>
+            <a:r>
+              <a:rPr lang="en-US" dirty="0" err="1">
+                <a:solidFill>
+                  <a:schemeClr val="accent6">
+                    <a:lumMod val="20000"/>
+                    <a:lumOff val="80000"/>
+                  </a:schemeClr>
+                </a:solidFill>
+              </a:rPr>
+              <a:t>coconn</a:t>
+            </a:r>
+            <a:r>
+              <a:rPr lang="en-US" dirty="0">
+                <a:solidFill>
+                  <a:schemeClr val="accent6">
+                    <a:lumMod val="20000"/>
+                    <a:lumOff val="80000"/>
+                  </a:schemeClr>
+                </a:solidFill>
+              </a:rPr>
+              <a:t>/Friday-Noon-Seminar-</a:t>
+            </a:r>
+            <a:r>
+              <a:rPr lang="en-US" dirty="0" err="1">
+                <a:solidFill>
+                  <a:schemeClr val="accent6">
+                    <a:lumMod val="20000"/>
+                    <a:lumOff val="80000"/>
+                  </a:schemeClr>
+                </a:solidFill>
+              </a:rPr>
+              <a:t>Git</a:t>
+            </a:r>
+            <a:r>
+              <a:rPr lang="en-US" dirty="0">
+                <a:solidFill>
+                  <a:schemeClr val="accent6">
+                    <a:lumMod val="20000"/>
+                    <a:lumOff val="80000"/>
+                  </a:schemeClr>
+                </a:solidFill>
+              </a:rPr>
+              <a:t>-</a:t>
+            </a:r>
+            <a:r>
+              <a:rPr lang="en-US" dirty="0" err="1" smtClean="0">
+                <a:solidFill>
+                  <a:schemeClr val="accent6">
+                    <a:lumMod val="20000"/>
+                    <a:lumOff val="80000"/>
+                  </a:schemeClr>
+                </a:solidFill>
+              </a:rPr>
+              <a:t>Github</a:t>
+            </a:r>
+            <a:endParaRPr lang="en-US" dirty="0" smtClean="0">
+              <a:solidFill>
+                <a:schemeClr val="accent6">
+                  <a:lumMod val="20000"/>
+                  <a:lumOff val="80000"/>
+                </a:schemeClr>
+              </a:solidFill>
+            </a:endParaRPr>
+          </a:p>
+          <a:p>
+            <a:r>
+              <a:rPr lang="en-US" dirty="0" smtClean="0">
+                <a:solidFill>
+                  <a:schemeClr val="accent6">
+                    <a:lumMod val="20000"/>
+                    <a:lumOff val="80000"/>
+                  </a:schemeClr>
+                </a:solidFill>
+              </a:rPr>
+              <a:t>“Fork” my FNS repository</a:t>
+            </a:r>
+          </a:p>
+          <a:p>
+            <a:r>
+              <a:rPr lang="en-US" dirty="0" smtClean="0">
+                <a:solidFill>
+                  <a:schemeClr val="accent6">
+                    <a:lumMod val="20000"/>
+                    <a:lumOff val="80000"/>
+                  </a:schemeClr>
+                </a:solidFill>
+              </a:rPr>
+              <a:t>“Clone” it to your desktop</a:t>
+            </a:r>
+          </a:p>
+          <a:p>
+            <a:r>
+              <a:rPr lang="en-US" dirty="0" smtClean="0">
+                <a:solidFill>
+                  <a:schemeClr val="accent6">
+                    <a:lumMod val="20000"/>
+                    <a:lumOff val="80000"/>
+                  </a:schemeClr>
+                </a:solidFill>
+              </a:rPr>
+              <a:t>Make a file that has your best </a:t>
+            </a:r>
+            <a:r>
+              <a:rPr lang="en-US" dirty="0" err="1" smtClean="0">
+                <a:solidFill>
+                  <a:schemeClr val="accent6">
+                    <a:lumMod val="20000"/>
+                    <a:lumOff val="80000"/>
+                  </a:schemeClr>
+                </a:solidFill>
+              </a:rPr>
+              <a:t>git</a:t>
+            </a:r>
+            <a:r>
+              <a:rPr lang="en-US" dirty="0" smtClean="0">
+                <a:solidFill>
+                  <a:schemeClr val="accent6">
+                    <a:lumMod val="20000"/>
+                    <a:lumOff val="80000"/>
+                  </a:schemeClr>
+                </a:solidFill>
+              </a:rPr>
+              <a:t>/</a:t>
+            </a:r>
+            <a:r>
+              <a:rPr lang="en-US" dirty="0" err="1" smtClean="0">
+                <a:solidFill>
+                  <a:schemeClr val="accent6">
+                    <a:lumMod val="20000"/>
+                    <a:lumOff val="80000"/>
+                  </a:schemeClr>
+                </a:solidFill>
+              </a:rPr>
+              <a:t>Github</a:t>
+            </a:r>
+            <a:r>
+              <a:rPr lang="en-US" dirty="0" smtClean="0">
+                <a:solidFill>
+                  <a:schemeClr val="accent6">
+                    <a:lumMod val="20000"/>
+                    <a:lumOff val="80000"/>
+                  </a:schemeClr>
+                </a:solidFill>
+              </a:rPr>
+              <a:t> pun in it (.txt, .r, .doc, .</a:t>
+            </a:r>
+            <a:r>
+              <a:rPr lang="en-US" dirty="0" err="1" smtClean="0">
+                <a:solidFill>
+                  <a:schemeClr val="accent6">
+                    <a:lumMod val="20000"/>
+                    <a:lumOff val="80000"/>
+                  </a:schemeClr>
+                </a:solidFill>
+              </a:rPr>
+              <a:t>pdf</a:t>
+            </a:r>
+            <a:r>
+              <a:rPr lang="en-US" dirty="0" smtClean="0">
+                <a:solidFill>
+                  <a:schemeClr val="accent6">
+                    <a:lumMod val="20000"/>
+                    <a:lumOff val="80000"/>
+                  </a:schemeClr>
+                </a:solidFill>
+              </a:rPr>
+              <a:t>, whatever), and push it as a commit to your </a:t>
+            </a:r>
+            <a:r>
+              <a:rPr lang="en-US" dirty="0" smtClean="0">
+                <a:solidFill>
+                  <a:schemeClr val="accent6">
+                    <a:lumMod val="20000"/>
+                    <a:lumOff val="80000"/>
+                  </a:schemeClr>
+                </a:solidFill>
+              </a:rPr>
+              <a:t>fork </a:t>
+            </a:r>
+            <a:r>
+              <a:rPr lang="en-US" dirty="0" err="1" smtClean="0">
+                <a:solidFill>
+                  <a:schemeClr val="accent6">
+                    <a:lumMod val="20000"/>
+                    <a:lumOff val="80000"/>
+                  </a:schemeClr>
+                </a:solidFill>
+              </a:rPr>
+              <a:t>withing</a:t>
+            </a:r>
+            <a:r>
+              <a:rPr lang="en-US" dirty="0" smtClean="0">
+                <a:solidFill>
+                  <a:schemeClr val="accent6">
+                    <a:lumMod val="20000"/>
+                    <a:lumOff val="80000"/>
+                  </a:schemeClr>
+                </a:solidFill>
+              </a:rPr>
+              <a:t> the Task3-</a:t>
+            </a:r>
+            <a:r>
+              <a:rPr lang="en-US" smtClean="0">
+                <a:solidFill>
+                  <a:schemeClr val="accent6">
+                    <a:lumMod val="20000"/>
+                    <a:lumOff val="80000"/>
+                  </a:schemeClr>
+                </a:solidFill>
+              </a:rPr>
+              <a:t>Puns folder</a:t>
+            </a:r>
+            <a:endParaRPr lang="en-US" dirty="0" smtClean="0">
+              <a:solidFill>
+                <a:schemeClr val="accent6">
+                  <a:lumMod val="20000"/>
+                  <a:lumOff val="80000"/>
+                </a:schemeClr>
+              </a:solidFill>
+            </a:endParaRPr>
+          </a:p>
+          <a:p>
+            <a:r>
+              <a:rPr lang="en-US" dirty="0" smtClean="0">
+                <a:solidFill>
+                  <a:schemeClr val="accent6">
+                    <a:lumMod val="20000"/>
+                    <a:lumOff val="80000"/>
+                  </a:schemeClr>
+                </a:solidFill>
+              </a:rPr>
+              <a:t>Click “pull request” (you’re requesting that I, Christine, “pull” your edit into the original repo)</a:t>
+            </a:r>
+            <a:endParaRPr lang="en-US" dirty="0">
+              <a:solidFill>
+                <a:schemeClr val="accent6">
+                  <a:lumMod val="20000"/>
+                  <a:lumOff val="80000"/>
+                </a:schemeClr>
+              </a:solidFill>
+            </a:endParaRPr>
+          </a:p>
+          <a:p>
+            <a:r>
+              <a:rPr lang="en-US" dirty="0" smtClean="0">
+                <a:solidFill>
+                  <a:schemeClr val="accent6">
+                    <a:lumMod val="20000"/>
+                    <a:lumOff val="80000"/>
+                  </a:schemeClr>
+                </a:solidFill>
+              </a:rPr>
+              <a:t>Done!</a:t>
+            </a:r>
+          </a:p>
+        </p:txBody>
+      </p:sp>
+      <p:pic>
+        <p:nvPicPr>
+          <p:cNvPr id="5" name="Picture 4"/>
+          <p:cNvPicPr>
+            <a:picLocks noChangeAspect="1"/>
+          </p:cNvPicPr>
+          <p:nvPr/>
+        </p:nvPicPr>
+        <p:blipFill>
+          <a:blip r:embed="rId2"/>
+          <a:stretch>
+            <a:fillRect/>
+          </a:stretch>
+        </p:blipFill>
+        <p:spPr>
+          <a:xfrm rot="15507223">
+            <a:off x="4720852" y="1685703"/>
+            <a:ext cx="5400903" cy="3697215"/>
+          </a:xfrm>
+          <a:prstGeom prst="rect">
+            <a:avLst/>
+          </a:prstGeom>
+        </p:spPr>
+      </p:pic>
+    </p:spTree>
+    <p:extLst>
+      <p:ext uri="{BB962C8B-B14F-4D97-AF65-F5344CB8AC3E}">
+        <p14:creationId xmlns:p14="http://schemas.microsoft.com/office/powerpoint/2010/main" val="3833578975"/>
+      </p:ext>
+    </p:extLst>
+  </p:cSld>
+  <p:clrMapOvr>
+    <a:masterClrMapping/>
+  </p:clrMapOvr>
+</p:sld>
+</file>
+
+<file path=ppt/slides/slide12.xml><?xml version="1.0" encoding="utf-8"?>
+<p:sld xmlns:a="http://schemas.openxmlformats.org/drawingml/2006/main" xmlns:r="http://schemas.openxmlformats.org/officeDocument/2006/relationships" xmlns:p="http://schemas.openxmlformats.org/presentationml/2006/main">
+  <p:cSld>
+    <p:spTree>
+      <p:nvGrpSpPr>
+        <p:cNvPr id="1" name=""/>
+        <p:cNvGrpSpPr/>
+        <p:nvPr/>
+      </p:nvGrpSpPr>
+      <p:grpSpPr>
+        <a:xfrm>
+          <a:off x="0" y="0"/>
+          <a:ext cx="0" cy="0"/>
+          <a:chOff x="0" y="0"/>
+          <a:chExt cx="0" cy="0"/>
+        </a:xfrm>
+      </p:grpSpPr>
+      <p:sp>
+        <p:nvSpPr>
+          <p:cNvPr id="2" name="Title 1"/>
+          <p:cNvSpPr>
+            <a:spLocks noGrp="1"/>
+          </p:cNvSpPr>
+          <p:nvPr>
+            <p:ph type="title"/>
+          </p:nvPr>
+        </p:nvSpPr>
+        <p:spPr/>
+        <p:txBody>
+          <a:bodyPr/>
+          <a:lstStyle/>
+          <a:p>
+            <a:endParaRPr lang="en-US"/>
+          </a:p>
+        </p:txBody>
+      </p:sp>
+      <p:sp>
+        <p:nvSpPr>
+          <p:cNvPr id="3" name="Content Placeholder 2"/>
+          <p:cNvSpPr>
+            <a:spLocks noGrp="1"/>
+          </p:cNvSpPr>
+          <p:nvPr>
+            <p:ph idx="1"/>
+          </p:nvPr>
+        </p:nvSpPr>
+        <p:spPr/>
+        <p:txBody>
+          <a:bodyPr/>
+          <a:lstStyle/>
+          <a:p>
+            <a:endParaRPr lang="en-US"/>
+          </a:p>
+        </p:txBody>
+      </p:sp>
+    </p:spTree>
+    <p:extLst>
+      <p:ext uri="{BB962C8B-B14F-4D97-AF65-F5344CB8AC3E}">
+        <p14:creationId xmlns:p14="http://schemas.microsoft.com/office/powerpoint/2010/main" val="1432485163"/>
+      </p:ext>
+    </p:extLst>
+  </p:cSld>
+  <p:clrMapOvr>
+    <a:masterClrMapping/>
+  </p:clrMapOvr>
+</p:sld>
+</file>
+
+<file path=ppt/slides/slide13.xml><?xml version="1.0" encoding="utf-8"?>
+<p:sld xmlns:a="http://schemas.openxmlformats.org/drawingml/2006/main" xmlns:r="http://schemas.openxmlformats.org/officeDocument/2006/relationships" xmlns:p="http://schemas.openxmlformats.org/presentationml/2006/main">
+  <p:cSld>
+    <p:spTree>
+      <p:nvGrpSpPr>
+        <p:cNvPr id="1" name=""/>
+        <p:cNvGrpSpPr/>
+        <p:nvPr/>
+      </p:nvGrpSpPr>
+      <p:grpSpPr>
+        <a:xfrm>
+          <a:off x="0" y="0"/>
+          <a:ext cx="0" cy="0"/>
+          <a:chOff x="0" y="0"/>
+          <a:chExt cx="0" cy="0"/>
+        </a:xfrm>
+      </p:grpSpPr>
+      <p:sp>
+        <p:nvSpPr>
+          <p:cNvPr id="2" name="Title 1"/>
+          <p:cNvSpPr>
+            <a:spLocks noGrp="1"/>
+          </p:cNvSpPr>
+          <p:nvPr>
+            <p:ph type="title"/>
+          </p:nvPr>
+        </p:nvSpPr>
+        <p:spPr/>
+        <p:txBody>
+          <a:bodyPr>
+            <a:normAutofit fontScale="90000"/>
+          </a:bodyPr>
+          <a:lstStyle/>
+          <a:p>
+            <a:r>
+              <a:rPr lang="en-US" dirty="0" smtClean="0"/>
+              <a:t>Some other slides that I might use as reference follow…</a:t>
+            </a:r>
+            <a:endParaRPr lang="en-US" dirty="0"/>
+          </a:p>
+        </p:txBody>
+      </p:sp>
+      <p:sp>
+        <p:nvSpPr>
+          <p:cNvPr id="3" name="Content Placeholder 2"/>
+          <p:cNvSpPr>
+            <a:spLocks noGrp="1"/>
+          </p:cNvSpPr>
+          <p:nvPr>
+            <p:ph idx="1"/>
+          </p:nvPr>
+        </p:nvSpPr>
+        <p:spPr/>
+        <p:txBody>
+          <a:bodyPr/>
+          <a:lstStyle/>
+          <a:p>
+            <a:endParaRPr lang="en-US" dirty="0"/>
+          </a:p>
+        </p:txBody>
+      </p:sp>
+    </p:spTree>
+    <p:extLst>
+      <p:ext uri="{BB962C8B-B14F-4D97-AF65-F5344CB8AC3E}">
+        <p14:creationId xmlns:p14="http://schemas.microsoft.com/office/powerpoint/2010/main" val="3361569810"/>
+      </p:ext>
+    </p:extLst>
+  </p:cSld>
+  <p:clrMapOvr>
+    <a:masterClrMapping/>
+  </p:clrMapOvr>
+</p:sld>
+</file>
+
+<file path=ppt/slides/slide14.xml><?xml version="1.0" encoding="utf-8"?>
+<p:sld xmlns:a="http://schemas.openxmlformats.org/drawingml/2006/main" xmlns:r="http://schemas.openxmlformats.org/officeDocument/2006/relationships" xmlns:p="http://schemas.openxmlformats.org/presentationml/2006/main">
+  <p:cSld>
+    <p:bg>
+      <p:bgPr>
+        <a:solidFill>
           <a:schemeClr val="bg2"/>
         </a:solidFill>
         <a:effectLst/>
@@ -4545,7 +5538,7 @@
 </p:sld>
 </file>
 
-<file path=ppt/slides/slide11.xml><?xml version="1.0" encoding="utf-8"?>
+<file path=ppt/slides/slide15.xml><?xml version="1.0" encoding="utf-8"?>
 <p:sld xmlns:a="http://schemas.openxmlformats.org/drawingml/2006/main" xmlns:r="http://schemas.openxmlformats.org/officeDocument/2006/relationships" xmlns:p="http://schemas.openxmlformats.org/presentationml/2006/main">
   <p:cSld>
     <p:bg>
@@ -4946,17 +5939,7 @@
                   </a:schemeClr>
                 </a:solidFill>
               </a:rPr>
-              <a:t>Goals for today</a:t>
-            </a:r>
-            <a:r>
-              <a:rPr lang="en-US" b="1" dirty="0" smtClean="0">
-                <a:solidFill>
-                  <a:schemeClr val="bg1">
-                    <a:lumMod val="25000"/>
-                  </a:schemeClr>
-                </a:solidFill>
-              </a:rPr>
-              <a:t>:</a:t>
+              <a:t>Goals for today:</a:t>
             </a:r>
             <a:endParaRPr lang="en-US" dirty="0">
               <a:solidFill>
@@ -6331,13 +7314,6 @@
               </a:rPr>
               <a:t>and (4) collaborate without writing over others’ work</a:t>
             </a:r>
-            <a:endParaRPr lang="en-US" sz="2400" dirty="0">
-              <a:solidFill>
-                <a:schemeClr val="tx1">
-                  <a:lumMod val="50000"/>
-                </a:schemeClr>
-              </a:solidFill>
-            </a:endParaRPr>
           </a:p>
         </p:txBody>
       </p:sp>
@@ -6524,7 +7500,7 @@
         </p:spPr>
         <p:txBody>
           <a:bodyPr anchor="ctr">
-            <a:normAutofit/>
+            <a:normAutofit lnSpcReduction="10000"/>
           </a:bodyPr>
           <a:lstStyle/>
           <a:p>
@@ -6534,18 +7510,14 @@
             <a:r>
               <a:rPr lang="en-US" b="1" dirty="0" smtClean="0">
                 <a:solidFill>
-                  <a:schemeClr val="bg1">
-                    <a:lumMod val="25000"/>
-                  </a:schemeClr>
+                  <a:srgbClr val="F0F0F0"/>
                 </a:solidFill>
               </a:rPr>
               <a:t>Links:</a:t>
             </a:r>
             <a:endParaRPr lang="en-US" dirty="0" smtClean="0">
               <a:solidFill>
-                <a:schemeClr val="bg1">
-                  <a:lumMod val="25000"/>
-                </a:schemeClr>
+                <a:srgbClr val="F0F0F0"/>
               </a:solidFill>
             </a:endParaRPr>
           </a:p>
@@ -6553,9 +7525,7 @@
             <a:r>
               <a:rPr lang="en-US" dirty="0" smtClean="0">
                 <a:solidFill>
-                  <a:schemeClr val="bg1">
-                    <a:lumMod val="25000"/>
-                  </a:schemeClr>
+                  <a:srgbClr val="F0F0F0"/>
                 </a:solidFill>
               </a:rPr>
               <a:t>https://</a:t>
@@ -6563,9 +7533,7 @@
             <a:r>
               <a:rPr lang="en-US" dirty="0" err="1" smtClean="0">
                 <a:solidFill>
-                  <a:schemeClr val="bg1">
-                    <a:lumMod val="25000"/>
-                  </a:schemeClr>
+                  <a:srgbClr val="F0F0F0"/>
                 </a:solidFill>
               </a:rPr>
               <a:t>github.com</a:t>
@@ -6573,9 +7541,7 @@
             <a:r>
               <a:rPr lang="en-US" dirty="0" smtClean="0">
                 <a:solidFill>
-                  <a:schemeClr val="bg1">
-                    <a:lumMod val="25000"/>
-                  </a:schemeClr>
+                  <a:srgbClr val="F0F0F0"/>
                 </a:solidFill>
               </a:rPr>
               <a:t>/</a:t>
@@ -6585,9 +7551,7 @@
             <a:r>
               <a:rPr lang="en-US" dirty="0" err="1" smtClean="0">
                 <a:solidFill>
-                  <a:schemeClr val="bg1">
-                    <a:lumMod val="25000"/>
-                  </a:schemeClr>
+                  <a:srgbClr val="F0F0F0"/>
                 </a:solidFill>
               </a:rPr>
               <a:t>github.com</a:t>
@@ -6595,9 +7559,7 @@
             <a:r>
               <a:rPr lang="en-US" dirty="0">
                 <a:solidFill>
-                  <a:schemeClr val="bg1">
-                    <a:lumMod val="25000"/>
-                  </a:schemeClr>
+                  <a:srgbClr val="F0F0F0"/>
                 </a:solidFill>
               </a:rPr>
               <a:t>/</a:t>
@@ -6605,29 +7567,125 @@
             <a:r>
               <a:rPr lang="en-US" dirty="0" err="1" smtClean="0">
                 <a:solidFill>
-                  <a:schemeClr val="bg1">
-                    <a:lumMod val="25000"/>
-                  </a:schemeClr>
+                  <a:srgbClr val="F0F0F0"/>
                 </a:solidFill>
               </a:rPr>
               <a:t>coconn</a:t>
             </a:r>
             <a:endParaRPr lang="en-US" dirty="0" smtClean="0">
               <a:solidFill>
-                <a:schemeClr val="bg1">
-                  <a:lumMod val="25000"/>
-                </a:schemeClr>
+                <a:srgbClr val="F0F0F0"/>
               </a:solidFill>
             </a:endParaRPr>
           </a:p>
           <a:p>
-            <a:endParaRPr lang="en-US" dirty="0">
+            <a:endParaRPr lang="en-US" dirty="0" smtClean="0">
               <a:solidFill>
-                <a:schemeClr val="bg1">
-                  <a:lumMod val="25000"/>
-                </a:schemeClr>
+                <a:srgbClr val="F0F0F0"/>
               </a:solidFill>
             </a:endParaRPr>
+          </a:p>
+          <a:p>
+            <a:r>
+              <a:rPr lang="en-US" dirty="0" smtClean="0">
+                <a:solidFill>
+                  <a:srgbClr val="F0F0F0"/>
+                </a:solidFill>
+              </a:rPr>
+              <a:t>Let’s see an example of where </a:t>
+            </a:r>
+            <a:r>
+              <a:rPr lang="en-US" dirty="0" err="1" smtClean="0">
+                <a:solidFill>
+                  <a:srgbClr val="F0F0F0"/>
+                </a:solidFill>
+              </a:rPr>
+              <a:t>PastChristine</a:t>
+            </a:r>
+            <a:r>
+              <a:rPr lang="en-US" dirty="0" smtClean="0">
+                <a:solidFill>
+                  <a:srgbClr val="F0F0F0"/>
+                </a:solidFill>
+              </a:rPr>
+              <a:t> locked it down for </a:t>
+            </a:r>
+            <a:r>
+              <a:rPr lang="en-US" dirty="0" err="1" smtClean="0">
+                <a:solidFill>
+                  <a:srgbClr val="F0F0F0"/>
+                </a:solidFill>
+              </a:rPr>
+              <a:t>FutureChristine</a:t>
+            </a:r>
+            <a:endParaRPr lang="en-US" dirty="0" smtClean="0">
+              <a:solidFill>
+                <a:srgbClr val="F0F0F0"/>
+              </a:solidFill>
+            </a:endParaRPr>
+          </a:p>
+          <a:p>
+            <a:pPr marL="0" indent="0">
+              <a:buNone/>
+            </a:pPr>
+            <a:endParaRPr lang="en-US" sz="2200" dirty="0" smtClean="0">
+              <a:solidFill>
+                <a:srgbClr val="F0F0F0"/>
+              </a:solidFill>
+            </a:endParaRPr>
+          </a:p>
+          <a:p>
+            <a:pPr marL="0" indent="0">
+              <a:buNone/>
+            </a:pPr>
+            <a:r>
+              <a:rPr lang="en-US" sz="2200" dirty="0" smtClean="0">
+                <a:solidFill>
+                  <a:srgbClr val="F0F0F0"/>
+                </a:solidFill>
+              </a:rPr>
+              <a:t>https</a:t>
+            </a:r>
+            <a:r>
+              <a:rPr lang="en-US" sz="2200" dirty="0">
+                <a:solidFill>
+                  <a:srgbClr val="F0F0F0"/>
+                </a:solidFill>
+              </a:rPr>
+              <a:t>://</a:t>
+            </a:r>
+            <a:r>
+              <a:rPr lang="en-US" sz="2200" dirty="0" err="1">
+                <a:solidFill>
+                  <a:srgbClr val="F0F0F0"/>
+                </a:solidFill>
+              </a:rPr>
+              <a:t>github.com</a:t>
+            </a:r>
+            <a:r>
+              <a:rPr lang="en-US" sz="2200" dirty="0">
+                <a:solidFill>
+                  <a:srgbClr val="F0F0F0"/>
+                </a:solidFill>
+              </a:rPr>
+              <a:t>/</a:t>
+            </a:r>
+            <a:r>
+              <a:rPr lang="en-US" sz="2200" dirty="0" err="1">
+                <a:solidFill>
+                  <a:srgbClr val="F0F0F0"/>
+                </a:solidFill>
+              </a:rPr>
+              <a:t>coconn</a:t>
+            </a:r>
+            <a:r>
+              <a:rPr lang="en-US" sz="2200" dirty="0">
+                <a:solidFill>
+                  <a:srgbClr val="F0F0F0"/>
+                </a:solidFill>
+              </a:rPr>
+              <a:t>/cso011code_TanguroN2OLosses/commits/master</a:t>
+            </a:r>
           </a:p>
         </p:txBody>
       </p:sp>
@@ -6678,6 +7736,14 @@
 <file path=ppt/slides/slide9.xml><?xml version="1.0" encoding="utf-8"?>
 <p:sld xmlns:a="http://schemas.openxmlformats.org/drawingml/2006/main" xmlns:r="http://schemas.openxmlformats.org/officeDocument/2006/relationships" xmlns:p="http://schemas.openxmlformats.org/presentationml/2006/main">
   <p:cSld>
+    <p:bg>
+      <p:bgPr>
+        <a:solidFill>
+          <a:schemeClr val="tx1"/>
+        </a:solidFill>
+        <a:effectLst/>
+      </p:bgPr>
+    </p:bg>
     <p:spTree>
       <p:nvGrpSpPr>
         <p:cNvPr id="1" name=""/>
@@ -6694,52 +7760,261 @@
       </p:grpSpPr>
       <p:sp>
         <p:nvSpPr>
-          <p:cNvPr id="2" name="Title 1"/>
-          <p:cNvSpPr>
-            <a:spLocks noGrp="1"/>
-          </p:cNvSpPr>
-          <p:nvPr>
-            <p:ph type="title"/>
-          </p:nvPr>
-        </p:nvSpPr>
-        <p:spPr/>
-        <p:txBody>
-          <a:bodyPr>
-            <a:normAutofit fontScale="90000"/>
+          <p:cNvPr id="4" name="Content Placeholder 2"/>
+          <p:cNvSpPr>
+            <a:spLocks noGrp="1"/>
+          </p:cNvSpPr>
+          <p:nvPr>
+            <p:ph idx="1"/>
+          </p:nvPr>
+        </p:nvSpPr>
+        <p:spPr>
+          <a:xfrm>
+            <a:off x="3021543" y="76641"/>
+            <a:ext cx="6122457" cy="6623971"/>
+          </a:xfrm>
+        </p:spPr>
+        <p:txBody>
+          <a:bodyPr anchor="ctr">
+            <a:normAutofit fontScale="77500" lnSpcReduction="20000"/>
           </a:bodyPr>
           <a:lstStyle/>
           <a:p>
-            <a:r>
-              <a:rPr lang="en-US" dirty="0" smtClean="0"/>
-              <a:t>Some other slides that I might use as reference follow…</a:t>
-            </a:r>
-            <a:endParaRPr lang="en-US" dirty="0"/>
-          </a:p>
-        </p:txBody>
-      </p:sp>
-      <p:sp>
-        <p:nvSpPr>
-          <p:cNvPr id="3" name="Content Placeholder 2"/>
-          <p:cNvSpPr>
-            <a:spLocks noGrp="1"/>
-          </p:cNvSpPr>
-          <p:nvPr>
-            <p:ph idx="1"/>
-          </p:nvPr>
-        </p:nvSpPr>
-        <p:spPr/>
-        <p:txBody>
-          <a:bodyPr/>
-          <a:lstStyle/>
-          <a:p>
-            <a:endParaRPr lang="en-US" dirty="0"/>
-          </a:p>
-        </p:txBody>
-      </p:sp>
+            <a:pPr marL="0" indent="0">
+              <a:buNone/>
+            </a:pPr>
+            <a:r>
+              <a:rPr lang="en-US" b="1" dirty="0" smtClean="0">
+                <a:solidFill>
+                  <a:schemeClr val="bg1">
+                    <a:lumMod val="25000"/>
+                  </a:schemeClr>
+                </a:solidFill>
+              </a:rPr>
+              <a:t>Task 1!</a:t>
+            </a:r>
+            <a:endParaRPr lang="en-US" dirty="0">
+              <a:solidFill>
+                <a:schemeClr val="bg1">
+                  <a:lumMod val="25000"/>
+                </a:schemeClr>
+              </a:solidFill>
+            </a:endParaRPr>
+          </a:p>
+          <a:p>
+            <a:r>
+              <a:rPr lang="en-US" dirty="0" smtClean="0">
+                <a:solidFill>
+                  <a:schemeClr val="bg1">
+                    <a:lumMod val="25000"/>
+                  </a:schemeClr>
+                </a:solidFill>
+              </a:rPr>
+              <a:t>Log in to your </a:t>
+            </a:r>
+            <a:r>
+              <a:rPr lang="en-US" dirty="0" err="1" smtClean="0">
+                <a:solidFill>
+                  <a:schemeClr val="bg1">
+                    <a:lumMod val="25000"/>
+                  </a:schemeClr>
+                </a:solidFill>
+              </a:rPr>
+              <a:t>Github</a:t>
+            </a:r>
+            <a:r>
+              <a:rPr lang="en-US" dirty="0" smtClean="0">
+                <a:solidFill>
+                  <a:schemeClr val="bg1">
+                    <a:lumMod val="25000"/>
+                  </a:schemeClr>
+                </a:solidFill>
+              </a:rPr>
+              <a:t> profile</a:t>
+            </a:r>
+          </a:p>
+          <a:p>
+            <a:r>
+              <a:rPr lang="en-US" dirty="0" smtClean="0">
+                <a:solidFill>
+                  <a:schemeClr val="bg1">
+                    <a:lumMod val="25000"/>
+                  </a:schemeClr>
+                </a:solidFill>
+              </a:rPr>
+              <a:t>Click “Repositories”</a:t>
+            </a:r>
+          </a:p>
+          <a:p>
+            <a:r>
+              <a:rPr lang="en-US" dirty="0" smtClean="0">
+                <a:solidFill>
+                  <a:schemeClr val="bg1">
+                    <a:lumMod val="25000"/>
+                  </a:schemeClr>
+                </a:solidFill>
+              </a:rPr>
+              <a:t>Click “New”</a:t>
+            </a:r>
+          </a:p>
+          <a:p>
+            <a:r>
+              <a:rPr lang="en-US" dirty="0" smtClean="0">
+                <a:solidFill>
+                  <a:schemeClr val="bg1">
+                    <a:lumMod val="25000"/>
+                  </a:schemeClr>
+                </a:solidFill>
+              </a:rPr>
+              <a:t>Click “Initialize with a README” (best practice)</a:t>
+            </a:r>
+          </a:p>
+          <a:p>
+            <a:r>
+              <a:rPr lang="en-US" dirty="0" smtClean="0">
+                <a:solidFill>
+                  <a:schemeClr val="bg1">
+                    <a:lumMod val="25000"/>
+                  </a:schemeClr>
+                </a:solidFill>
+              </a:rPr>
+              <a:t>Repo to make: A storage area for a personal hero!</a:t>
+            </a:r>
+          </a:p>
+          <a:p>
+            <a:r>
+              <a:rPr lang="en-US" dirty="0" smtClean="0">
+                <a:solidFill>
+                  <a:schemeClr val="bg1">
+                    <a:lumMod val="25000"/>
+                  </a:schemeClr>
+                </a:solidFill>
+              </a:rPr>
+              <a:t>Click “Clone in desktop”</a:t>
+            </a:r>
+          </a:p>
+          <a:p>
+            <a:r>
+              <a:rPr lang="en-US" dirty="0" smtClean="0">
+                <a:solidFill>
+                  <a:schemeClr val="bg1">
+                    <a:lumMod val="25000"/>
+                  </a:schemeClr>
+                </a:solidFill>
+              </a:rPr>
+              <a:t>Save your repo wherever you like on your computer</a:t>
+            </a:r>
+          </a:p>
+          <a:p>
+            <a:r>
+              <a:rPr lang="en-US" dirty="0" smtClean="0">
+                <a:solidFill>
+                  <a:schemeClr val="bg1">
+                    <a:lumMod val="25000"/>
+                  </a:schemeClr>
+                </a:solidFill>
+              </a:rPr>
+              <a:t>Use </a:t>
+            </a:r>
+            <a:r>
+              <a:rPr lang="en-US" dirty="0" err="1" smtClean="0">
+                <a:solidFill>
+                  <a:schemeClr val="bg1">
+                    <a:lumMod val="25000"/>
+                  </a:schemeClr>
+                </a:solidFill>
+              </a:rPr>
+              <a:t>google</a:t>
+            </a:r>
+            <a:r>
+              <a:rPr lang="en-US" dirty="0" smtClean="0">
+                <a:solidFill>
+                  <a:schemeClr val="bg1">
+                    <a:lumMod val="25000"/>
+                  </a:schemeClr>
+                </a:solidFill>
+              </a:rPr>
+              <a:t> images to download a rad image</a:t>
+            </a:r>
+          </a:p>
+          <a:p>
+            <a:r>
+              <a:rPr lang="en-US" dirty="0" smtClean="0">
+                <a:solidFill>
+                  <a:schemeClr val="bg1">
+                    <a:lumMod val="25000"/>
+                  </a:schemeClr>
+                </a:solidFill>
+              </a:rPr>
+              <a:t>Put it in your personal hero folder on your computer</a:t>
+            </a:r>
+          </a:p>
+          <a:p>
+            <a:r>
+              <a:rPr lang="en-US" dirty="0" smtClean="0">
+                <a:solidFill>
+                  <a:schemeClr val="bg1">
+                    <a:lumMod val="25000"/>
+                  </a:schemeClr>
+                </a:solidFill>
+              </a:rPr>
+              <a:t>“Commit and sync”</a:t>
+            </a:r>
+          </a:p>
+          <a:p>
+            <a:r>
+              <a:rPr lang="en-US" dirty="0" smtClean="0">
+                <a:solidFill>
+                  <a:schemeClr val="bg1">
+                    <a:lumMod val="25000"/>
+                  </a:schemeClr>
+                </a:solidFill>
+              </a:rPr>
+              <a:t>Click refresh on your repo online</a:t>
+            </a:r>
+          </a:p>
+          <a:p>
+            <a:r>
+              <a:rPr lang="en-US" dirty="0" smtClean="0">
+                <a:solidFill>
+                  <a:schemeClr val="bg1">
+                    <a:lumMod val="25000"/>
+                  </a:schemeClr>
+                </a:solidFill>
+              </a:rPr>
+              <a:t>You should see the change!</a:t>
+            </a:r>
+          </a:p>
+        </p:txBody>
+      </p:sp>
+      <p:pic>
+        <p:nvPicPr>
+          <p:cNvPr id="5" name="Picture 4"/>
+          <p:cNvPicPr>
+            <a:picLocks noChangeAspect="1"/>
+          </p:cNvPicPr>
+          <p:nvPr/>
+        </p:nvPicPr>
+        <p:blipFill>
+          <a:blip r:embed="rId2"/>
+          <a:stretch>
+            <a:fillRect/>
+          </a:stretch>
+        </p:blipFill>
+        <p:spPr>
+          <a:xfrm rot="21023587">
+            <a:off x="44956" y="1583802"/>
+            <a:ext cx="3321466" cy="3442002"/>
+          </a:xfrm>
+          <a:prstGeom prst="rect">
+            <a:avLst/>
+          </a:prstGeom>
+        </p:spPr>
+      </p:pic>
     </p:spTree>
     <p:extLst>
       <p:ext uri="{BB962C8B-B14F-4D97-AF65-F5344CB8AC3E}">
-        <p14:creationId xmlns:p14="http://schemas.microsoft.com/office/powerpoint/2010/main" val="3361569810"/>
+        <p14:creationId xmlns:p14="http://schemas.microsoft.com/office/powerpoint/2010/main" val="1627268206"/>
       </p:ext>
     </p:extLst>
   </p:cSld>

</xml_diff>